<commit_message>
Finishes Bachelor's Thesis and Exports to PDF
</commit_message>
<xml_diff>
--- a/5 Abschlussphase/final_presentation.pptx
+++ b/5 Abschlussphase/final_presentation.pptx
@@ -5,7 +5,7 @@
     <p:sldMasterId id="2147483648" r:id="rId1"/>
   </p:sldMasterIdLst>
   <p:notesMasterIdLst>
-    <p:notesMasterId r:id="rId34"/>
+    <p:notesMasterId r:id="rId35"/>
   </p:notesMasterIdLst>
   <p:sldIdLst>
     <p:sldId id="256" r:id="rId2"/>
@@ -38,8 +38,9 @@
     <p:sldId id="299" r:id="rId29"/>
     <p:sldId id="289" r:id="rId30"/>
     <p:sldId id="291" r:id="rId31"/>
-    <p:sldId id="300" r:id="rId32"/>
-    <p:sldId id="301" r:id="rId33"/>
+    <p:sldId id="303" r:id="rId32"/>
+    <p:sldId id="300" r:id="rId33"/>
+    <p:sldId id="301" r:id="rId34"/>
   </p:sldIdLst>
   <p:sldSz cx="12192000" cy="6858000"/>
   <p:notesSz cx="6858000" cy="9144000"/>
@@ -239,7 +240,7 @@
           <a:p>
             <a:fld id="{714FBFDE-3112-4F44-86E4-1C18FF95567A}" type="datetimeFigureOut">
               <a:rPr lang="en-US" smtClean="0"/>
-              <a:t>9/12/2018</a:t>
+              <a:t>9/14/2018</a:t>
             </a:fld>
             <a:endParaRPr lang="en-US"/>
           </a:p>
@@ -2296,6 +2297,90 @@
 </p:notes>
 </file>
 
+<file path=ppt/notesSlides/notesSlide27.xml><?xml version="1.0" encoding="utf-8"?>
+<p:notes xmlns:a="http://schemas.openxmlformats.org/drawingml/2006/main" xmlns:r="http://schemas.openxmlformats.org/officeDocument/2006/relationships" xmlns:p="http://schemas.openxmlformats.org/presentationml/2006/main">
+  <p:cSld>
+    <p:spTree>
+      <p:nvGrpSpPr>
+        <p:cNvPr id="1" name=""/>
+        <p:cNvGrpSpPr/>
+        <p:nvPr/>
+      </p:nvGrpSpPr>
+      <p:grpSpPr>
+        <a:xfrm>
+          <a:off x="0" y="0"/>
+          <a:ext cx="0" cy="0"/>
+          <a:chOff x="0" y="0"/>
+          <a:chExt cx="0" cy="0"/>
+        </a:xfrm>
+      </p:grpSpPr>
+      <p:sp>
+        <p:nvSpPr>
+          <p:cNvPr id="2" name="Slide Image Placeholder 1"/>
+          <p:cNvSpPr>
+            <a:spLocks noGrp="1" noRot="1" noChangeAspect="1"/>
+          </p:cNvSpPr>
+          <p:nvPr>
+            <p:ph type="sldImg"/>
+          </p:nvPr>
+        </p:nvSpPr>
+        <p:spPr/>
+      </p:sp>
+      <p:sp>
+        <p:nvSpPr>
+          <p:cNvPr id="3" name="Notes Placeholder 2"/>
+          <p:cNvSpPr>
+            <a:spLocks noGrp="1"/>
+          </p:cNvSpPr>
+          <p:nvPr>
+            <p:ph type="body" idx="1"/>
+          </p:nvPr>
+        </p:nvSpPr>
+        <p:spPr/>
+        <p:txBody>
+          <a:bodyPr/>
+          <a:lstStyle/>
+          <a:p>
+            <a:endParaRPr lang="en-US"/>
+          </a:p>
+        </p:txBody>
+      </p:sp>
+      <p:sp>
+        <p:nvSpPr>
+          <p:cNvPr id="4" name="Slide Number Placeholder 3"/>
+          <p:cNvSpPr>
+            <a:spLocks noGrp="1"/>
+          </p:cNvSpPr>
+          <p:nvPr>
+            <p:ph type="sldNum" sz="quarter" idx="10"/>
+          </p:nvPr>
+        </p:nvSpPr>
+        <p:spPr/>
+        <p:txBody>
+          <a:bodyPr/>
+          <a:lstStyle/>
+          <a:p>
+            <a:fld id="{A3BCD827-271C-42E1-82EA-F73FE1A3B247}" type="slidenum">
+              <a:rPr lang="en-US" smtClean="0"/>
+              <a:t>31</a:t>
+            </a:fld>
+            <a:endParaRPr lang="en-US"/>
+          </a:p>
+        </p:txBody>
+      </p:sp>
+    </p:spTree>
+    <p:extLst>
+      <p:ext uri="{BB962C8B-B14F-4D97-AF65-F5344CB8AC3E}">
+        <p14:creationId xmlns:p14="http://schemas.microsoft.com/office/powerpoint/2010/main" val="671678602"/>
+      </p:ext>
+    </p:extLst>
+  </p:cSld>
+  <p:clrMapOvr>
+    <a:masterClrMapping/>
+  </p:clrMapOvr>
+</p:notes>
+</file>
+
 <file path=ppt/notesSlides/notesSlide3.xml><?xml version="1.0" encoding="utf-8"?>
 <p:notes xmlns:a="http://schemas.openxmlformats.org/drawingml/2006/main" xmlns:r="http://schemas.openxmlformats.org/officeDocument/2006/relationships" xmlns:p="http://schemas.openxmlformats.org/presentationml/2006/main">
   <p:cSld>
@@ -3135,7 +3220,7 @@
               <a:rPr lang="en-US" smtClean="0">
                 <a:uFillTx/>
               </a:rPr>
-              <a:t>9/12/2018</a:t>
+              <a:t>9/14/2018</a:t>
             </a:fld>
             <a:endParaRPr lang="en-US">
               <a:uFillTx/>
@@ -3320,7 +3405,7 @@
               <a:rPr lang="en-US" smtClean="0">
                 <a:uFillTx/>
               </a:rPr>
-              <a:t>9/12/2018</a:t>
+              <a:t>9/14/2018</a:t>
             </a:fld>
             <a:endParaRPr lang="en-US">
               <a:uFillTx/>
@@ -3515,7 +3600,7 @@
               <a:rPr lang="en-US" smtClean="0">
                 <a:uFillTx/>
               </a:rPr>
-              <a:t>9/12/2018</a:t>
+              <a:t>9/14/2018</a:t>
             </a:fld>
             <a:endParaRPr lang="en-US">
               <a:uFillTx/>
@@ -3700,7 +3785,7 @@
               <a:rPr lang="en-US" smtClean="0">
                 <a:uFillTx/>
               </a:rPr>
-              <a:t>9/12/2018</a:t>
+              <a:t>9/14/2018</a:t>
             </a:fld>
             <a:endParaRPr lang="en-US">
               <a:uFillTx/>
@@ -3965,7 +4050,7 @@
               <a:rPr lang="en-US" smtClean="0">
                 <a:uFillTx/>
               </a:rPr>
-              <a:t>9/12/2018</a:t>
+              <a:t>9/14/2018</a:t>
             </a:fld>
             <a:endParaRPr lang="en-US">
               <a:uFillTx/>
@@ -4221,7 +4306,7 @@
               <a:rPr lang="en-US" smtClean="0">
                 <a:uFillTx/>
               </a:rPr>
-              <a:t>9/12/2018</a:t>
+              <a:t>9/14/2018</a:t>
             </a:fld>
             <a:endParaRPr lang="en-US">
               <a:uFillTx/>
@@ -4652,7 +4737,7 @@
               <a:rPr lang="en-US" smtClean="0">
                 <a:uFillTx/>
               </a:rPr>
-              <a:t>9/12/2018</a:t>
+              <a:t>9/14/2018</a:t>
             </a:fld>
             <a:endParaRPr lang="en-US">
               <a:uFillTx/>
@@ -4776,7 +4861,7 @@
               <a:rPr lang="en-US" smtClean="0">
                 <a:uFillTx/>
               </a:rPr>
-              <a:t>9/12/2018</a:t>
+              <a:t>9/14/2018</a:t>
             </a:fld>
             <a:endParaRPr lang="en-US">
               <a:uFillTx/>
@@ -4876,7 +4961,7 @@
               <a:rPr lang="en-US" smtClean="0">
                 <a:uFillTx/>
               </a:rPr>
-              <a:t>9/12/2018</a:t>
+              <a:t>9/14/2018</a:t>
             </a:fld>
             <a:endParaRPr lang="en-US">
               <a:uFillTx/>
@@ -5208,7 +5293,7 @@
               <a:rPr lang="en-US" smtClean="0">
                 <a:uFillTx/>
               </a:rPr>
-              <a:t>9/12/2018</a:t>
+              <a:t>9/14/2018</a:t>
             </a:fld>
             <a:endParaRPr lang="en-US">
               <a:uFillTx/>
@@ -5509,7 +5594,7 @@
               <a:rPr lang="en-US" smtClean="0">
                 <a:uFillTx/>
               </a:rPr>
-              <a:t>9/12/2018</a:t>
+              <a:t>9/14/2018</a:t>
             </a:fld>
             <a:endParaRPr lang="en-US">
               <a:uFillTx/>
@@ -5738,7 +5823,7 @@
               <a:rPr lang="en-US" smtClean="0">
                 <a:uFillTx/>
               </a:rPr>
-              <a:t>9/12/2018</a:t>
+              <a:t>9/14/2018</a:t>
             </a:fld>
             <a:endParaRPr lang="en-US">
               <a:uFillTx/>
@@ -12231,76 +12316,6 @@
           <a:noFill/>
         </p:spPr>
       </p:pic>
-      <p:pic>
-        <p:nvPicPr>
-          <p:cNvPr id="6" name="Picture 5">
-            <a:extLst>
-              <a:ext uri="{FF2B5EF4-FFF2-40B4-BE49-F238E27FC236}">
-                <a16:creationId xmlns:a16="http://schemas.microsoft.com/office/drawing/2014/main" id="{E7DECBD0-45C7-45B7-A2AF-9F6067DB2D09}"/>
-              </a:ext>
-            </a:extLst>
-          </p:cNvPr>
-          <p:cNvPicPr/>
-          <p:nvPr/>
-        </p:nvPicPr>
-        <p:blipFill rotWithShape="1">
-          <a:blip r:embed="rId4"/>
-          <a:srcRect t="8014" r="61227"/>
-          <a:stretch/>
-        </p:blipFill>
-        <p:spPr bwMode="auto">
-          <a:xfrm>
-            <a:off x="8827150" y="3511550"/>
-            <a:ext cx="3021949" cy="3097213"/>
-          </a:xfrm>
-          <a:prstGeom prst="rect">
-            <a:avLst/>
-          </a:prstGeom>
-          <a:ln>
-            <a:noFill/>
-          </a:ln>
-          <a:extLst>
-            <a:ext uri="{53640926-AAD7-44D8-BBD7-CCE9431645EC}">
-              <a14:shadowObscured xmlns:a14="http://schemas.microsoft.com/office/drawing/2010/main"/>
-            </a:ext>
-          </a:extLst>
-        </p:spPr>
-      </p:pic>
-      <p:pic>
-        <p:nvPicPr>
-          <p:cNvPr id="9" name="Picture 8">
-            <a:extLst>
-              <a:ext uri="{FF2B5EF4-FFF2-40B4-BE49-F238E27FC236}">
-                <a16:creationId xmlns:a16="http://schemas.microsoft.com/office/drawing/2014/main" id="{A0E8857A-C22B-4BC8-AE5F-5B507686FD19}"/>
-              </a:ext>
-            </a:extLst>
-          </p:cNvPr>
-          <p:cNvPicPr/>
-          <p:nvPr/>
-        </p:nvPicPr>
-        <p:blipFill rotWithShape="1">
-          <a:blip r:embed="rId4"/>
-          <a:srcRect t="8014" r="61227"/>
-          <a:stretch/>
-        </p:blipFill>
-        <p:spPr bwMode="auto">
-          <a:xfrm>
-            <a:off x="286400" y="1085850"/>
-            <a:ext cx="5536550" cy="5674442"/>
-          </a:xfrm>
-          <a:prstGeom prst="rect">
-            <a:avLst/>
-          </a:prstGeom>
-          <a:ln>
-            <a:noFill/>
-          </a:ln>
-          <a:extLst>
-            <a:ext uri="{53640926-AAD7-44D8-BBD7-CCE9431645EC}">
-              <a14:shadowObscured xmlns:a14="http://schemas.microsoft.com/office/drawing/2010/main"/>
-            </a:ext>
-          </a:extLst>
-        </p:spPr>
-      </p:pic>
       <p:sp>
         <p:nvSpPr>
           <p:cNvPr id="3" name="Slide Number Placeholder 2">
@@ -12334,108 +12349,40 @@
           </a:p>
         </p:txBody>
       </p:sp>
-      <p:sp>
-        <p:nvSpPr>
-          <p:cNvPr id="10" name="Content Placeholder 2">
+      <p:pic>
+        <p:nvPicPr>
+          <p:cNvPr id="8" name="Picture 7">
             <a:extLst>
               <a:ext uri="{FF2B5EF4-FFF2-40B4-BE49-F238E27FC236}">
-                <a16:creationId xmlns:a16="http://schemas.microsoft.com/office/drawing/2014/main" id="{931039FD-7A2D-450D-B34D-40831A89E44C}"/>
+                <a16:creationId xmlns:a16="http://schemas.microsoft.com/office/drawing/2014/main" id="{112AF475-7BC1-4EB0-BA76-2E85062A122D}"/>
               </a:ext>
             </a:extLst>
           </p:cNvPr>
-          <p:cNvSpPr>
-            <a:spLocks noGrp="1"/>
-          </p:cNvSpPr>
-          <p:nvPr>
-            <p:ph idx="1"/>
-          </p:nvPr>
-        </p:nvSpPr>
+          <p:cNvPicPr/>
+          <p:nvPr/>
+        </p:nvPicPr>
+        <p:blipFill>
+          <a:blip r:embed="rId4" cstate="print">
+            <a:extLst>
+              <a:ext uri="{28A0092B-C50C-407E-A947-70E740481C1C}">
+                <a14:useLocalDpi xmlns:a14="http://schemas.microsoft.com/office/drawing/2010/main" val="0"/>
+              </a:ext>
+            </a:extLst>
+          </a:blip>
+          <a:stretch>
+            <a:fillRect/>
+          </a:stretch>
+        </p:blipFill>
         <p:spPr>
           <a:xfrm>
-            <a:off x="8037095" y="2294021"/>
-            <a:ext cx="3523106" cy="4167335"/>
-          </a:xfrm>
-        </p:spPr>
-        <p:txBody>
-          <a:bodyPr>
-            <a:normAutofit/>
-          </a:bodyPr>
-          <a:lstStyle/>
-          <a:p>
-            <a:pPr algn="just">
-              <a:buClr>
-                <a:srgbClr val="FFC000"/>
-              </a:buClr>
-              <a:buFont typeface="Wingdings" panose="05000000000000000000" pitchFamily="2" charset="2"/>
-              <a:buChar char="§"/>
-            </a:pPr>
-            <a:r>
-              <a:rPr lang="en-GB" sz="2200"/>
-              <a:t>Zoom in to a small part</a:t>
-            </a:r>
-          </a:p>
-          <a:p>
-            <a:pPr algn="just">
-              <a:buClr>
-                <a:srgbClr val="FFC000"/>
-              </a:buClr>
-              <a:buFont typeface="Wingdings" panose="05000000000000000000" pitchFamily="2" charset="2"/>
-              <a:buChar char="§"/>
-            </a:pPr>
-            <a:endParaRPr lang="en-GB" sz="2200"/>
-          </a:p>
-          <a:p>
-            <a:pPr algn="just">
-              <a:buClr>
-                <a:srgbClr val="FFC000"/>
-              </a:buClr>
-              <a:buFont typeface="Wingdings" panose="05000000000000000000" pitchFamily="2" charset="2"/>
-              <a:buChar char="§"/>
-            </a:pPr>
-            <a:endParaRPr lang="en-GB" sz="2200"/>
-          </a:p>
-          <a:p>
-            <a:pPr algn="just">
-              <a:buClr>
-                <a:srgbClr val="FFC000"/>
-              </a:buClr>
-              <a:buFont typeface="Wingdings" panose="05000000000000000000" pitchFamily="2" charset="2"/>
-              <a:buChar char="§"/>
-            </a:pPr>
-            <a:endParaRPr lang="en-GB" sz="2200"/>
-          </a:p>
-          <a:p>
-            <a:pPr algn="just">
-              <a:buClr>
-                <a:srgbClr val="FFC000"/>
-              </a:buClr>
-              <a:buFont typeface="Wingdings" panose="05000000000000000000" pitchFamily="2" charset="2"/>
-              <a:buChar char="§"/>
-            </a:pPr>
-            <a:endParaRPr lang="en-GB" sz="2200"/>
-          </a:p>
-          <a:p>
-            <a:pPr algn="just">
-              <a:buClr>
-                <a:srgbClr val="FFC000"/>
-              </a:buClr>
-              <a:buFont typeface="Wingdings" panose="05000000000000000000" pitchFamily="2" charset="2"/>
-              <a:buChar char="§"/>
-            </a:pPr>
-            <a:endParaRPr lang="en-GB" sz="2200"/>
-          </a:p>
-          <a:p>
-            <a:pPr lvl="1" algn="just">
-              <a:buClr>
-                <a:srgbClr val="FFC000"/>
-              </a:buClr>
-              <a:buFont typeface="Wingdings" panose="05000000000000000000" pitchFamily="2" charset="2"/>
-              <a:buChar char="§"/>
-            </a:pPr>
-            <a:endParaRPr lang="en-GB" sz="1800"/>
-          </a:p>
-        </p:txBody>
-      </p:sp>
+            <a:off x="1636576" y="1016635"/>
+            <a:ext cx="8651240" cy="5704840"/>
+          </a:xfrm>
+          <a:prstGeom prst="rect">
+            <a:avLst/>
+          </a:prstGeom>
+        </p:spPr>
+      </p:pic>
     </p:spTree>
     <p:extLst>
       <p:ext uri="{BB962C8B-B14F-4D97-AF65-F5344CB8AC3E}">
@@ -12466,6 +12413,180 @@
           <a:chExt cx="0" cy="0"/>
         </a:xfrm>
       </p:grpSpPr>
+      <p:cxnSp>
+        <p:nvCxnSpPr>
+          <p:cNvPr id="12" name="Straight Connector 11">
+            <a:extLst>
+              <a:ext uri="{FF2B5EF4-FFF2-40B4-BE49-F238E27FC236}">
+                <a16:creationId xmlns:a16="http://schemas.microsoft.com/office/drawing/2014/main" id="{C4CF4571-3936-49BE-BE01-E3D95136E1AB}"/>
+              </a:ext>
+            </a:extLst>
+          </p:cNvPr>
+          <p:cNvCxnSpPr>
+            <a:cxnSpLocks/>
+          </p:cNvCxnSpPr>
+          <p:nvPr/>
+        </p:nvCxnSpPr>
+        <p:spPr>
+          <a:xfrm flipV="1">
+            <a:off x="1104629" y="4414838"/>
+            <a:ext cx="8072709" cy="1747838"/>
+          </a:xfrm>
+          <a:prstGeom prst="line">
+            <a:avLst/>
+          </a:prstGeom>
+          <a:ln w="3175">
+            <a:solidFill>
+              <a:srgbClr val="0000FF"/>
+            </a:solidFill>
+            <a:prstDash val="dash"/>
+          </a:ln>
+        </p:spPr>
+        <p:style>
+          <a:lnRef idx="1">
+            <a:schemeClr val="accent1"/>
+          </a:lnRef>
+          <a:fillRef idx="0">
+            <a:schemeClr val="accent1"/>
+          </a:fillRef>
+          <a:effectRef idx="0">
+            <a:schemeClr val="accent1"/>
+          </a:effectRef>
+          <a:fontRef idx="minor">
+            <a:schemeClr val="tx1"/>
+          </a:fontRef>
+        </p:style>
+      </p:cxnSp>
+      <p:cxnSp>
+        <p:nvCxnSpPr>
+          <p:cNvPr id="11" name="Straight Connector 10">
+            <a:extLst>
+              <a:ext uri="{FF2B5EF4-FFF2-40B4-BE49-F238E27FC236}">
+                <a16:creationId xmlns:a16="http://schemas.microsoft.com/office/drawing/2014/main" id="{18DD5A66-6EF9-4228-8E0B-5D68C23ABF23}"/>
+              </a:ext>
+            </a:extLst>
+          </p:cNvPr>
+          <p:cNvCxnSpPr>
+            <a:cxnSpLocks/>
+          </p:cNvCxnSpPr>
+          <p:nvPr/>
+        </p:nvCxnSpPr>
+        <p:spPr>
+          <a:xfrm>
+            <a:off x="1104629" y="1866900"/>
+            <a:ext cx="8072709" cy="1845503"/>
+          </a:xfrm>
+          <a:prstGeom prst="line">
+            <a:avLst/>
+          </a:prstGeom>
+          <a:ln w="3175">
+            <a:solidFill>
+              <a:srgbClr val="0000FF"/>
+            </a:solidFill>
+            <a:prstDash val="dash"/>
+          </a:ln>
+        </p:spPr>
+        <p:style>
+          <a:lnRef idx="1">
+            <a:schemeClr val="accent1"/>
+          </a:lnRef>
+          <a:fillRef idx="0">
+            <a:schemeClr val="accent1"/>
+          </a:fillRef>
+          <a:effectRef idx="0">
+            <a:schemeClr val="accent1"/>
+          </a:effectRef>
+          <a:fontRef idx="minor">
+            <a:schemeClr val="tx1"/>
+          </a:fontRef>
+        </p:style>
+      </p:cxnSp>
+      <p:sp>
+        <p:nvSpPr>
+          <p:cNvPr id="16" name="Rectangle 15">
+            <a:extLst>
+              <a:ext uri="{FF2B5EF4-FFF2-40B4-BE49-F238E27FC236}">
+                <a16:creationId xmlns:a16="http://schemas.microsoft.com/office/drawing/2014/main" id="{52839CBE-53DB-4259-ADA9-F1406D56DBCC}"/>
+              </a:ext>
+            </a:extLst>
+          </p:cNvPr>
+          <p:cNvSpPr/>
+          <p:nvPr/>
+        </p:nvSpPr>
+        <p:spPr>
+          <a:xfrm>
+            <a:off x="903366" y="1427991"/>
+            <a:ext cx="5911363" cy="5290309"/>
+          </a:xfrm>
+          <a:prstGeom prst="rect">
+            <a:avLst/>
+          </a:prstGeom>
+          <a:solidFill>
+            <a:schemeClr val="bg1"/>
+          </a:solidFill>
+          <a:ln w="38100">
+            <a:noFill/>
+            <a:prstDash val="dash"/>
+          </a:ln>
+        </p:spPr>
+        <p:style>
+          <a:lnRef idx="2">
+            <a:schemeClr val="accent1">
+              <a:shade val="50000"/>
+            </a:schemeClr>
+          </a:lnRef>
+          <a:fillRef idx="1">
+            <a:schemeClr val="accent1"/>
+          </a:fillRef>
+          <a:effectRef idx="0">
+            <a:schemeClr val="accent1"/>
+          </a:effectRef>
+          <a:fontRef idx="minor">
+            <a:schemeClr val="lt1"/>
+          </a:fontRef>
+        </p:style>
+        <p:txBody>
+          <a:bodyPr rtlCol="0" anchor="ctr"/>
+          <a:lstStyle/>
+          <a:p>
+            <a:pPr algn="ctr"/>
+            <a:endParaRPr lang="en-US"/>
+          </a:p>
+        </p:txBody>
+      </p:sp>
+      <p:pic>
+        <p:nvPicPr>
+          <p:cNvPr id="15" name="Picture 14">
+            <a:extLst>
+              <a:ext uri="{FF2B5EF4-FFF2-40B4-BE49-F238E27FC236}">
+                <a16:creationId xmlns:a16="http://schemas.microsoft.com/office/drawing/2014/main" id="{BBB85B12-7FE5-4CBA-99BB-2AC5D8D74C34}"/>
+              </a:ext>
+            </a:extLst>
+          </p:cNvPr>
+          <p:cNvPicPr/>
+          <p:nvPr/>
+        </p:nvPicPr>
+        <p:blipFill rotWithShape="1">
+          <a:blip r:embed="rId3" cstate="print">
+            <a:extLst>
+              <a:ext uri="{28A0092B-C50C-407E-A947-70E740481C1C}">
+                <a14:useLocalDpi xmlns:a14="http://schemas.microsoft.com/office/drawing/2010/main" val="0"/>
+              </a:ext>
+            </a:extLst>
+          </a:blip>
+          <a:srcRect l="5393" t="42215" r="57597" b="8025"/>
+          <a:stretch/>
+        </p:blipFill>
+        <p:spPr>
+          <a:xfrm>
+            <a:off x="926194" y="1466851"/>
+            <a:ext cx="5926635" cy="5254624"/>
+          </a:xfrm>
+          <a:prstGeom prst="rect">
+            <a:avLst/>
+          </a:prstGeom>
+        </p:spPr>
+      </p:pic>
       <p:sp>
         <p:nvSpPr>
           <p:cNvPr id="2" name="Title 1"/>
@@ -12495,7 +12616,7 @@
                 </a:solidFill>
                 <a:uFillTx/>
               </a:rPr>
-              <a:t>Bachelor Thesis</a:t>
+              <a:t>Result</a:t>
             </a:r>
             <a:br>
               <a:rPr lang="en-US" sz="3200" b="1">
@@ -12514,7 +12635,7 @@
                 </a:solidFill>
                 <a:uFillTx/>
               </a:rPr>
-              <a:t>Evaluation and Next Steps</a:t>
+              <a:t>P&amp;ID of Aida Brewery</a:t>
             </a:r>
             <a:endParaRPr lang="en-US" sz="2200" dirty="0">
               <a:solidFill>
@@ -12529,14 +12650,20 @@
       </p:sp>
       <p:pic>
         <p:nvPicPr>
-          <p:cNvPr id="9" name="Picture 2" descr="Image result for gefasoft logo svg"/>
+          <p:cNvPr id="7" name="Picture 2" descr="Image result for gefasoft logo svg">
+            <a:extLst>
+              <a:ext uri="{FF2B5EF4-FFF2-40B4-BE49-F238E27FC236}">
+                <a16:creationId xmlns:a16="http://schemas.microsoft.com/office/drawing/2014/main" id="{785B496B-0E86-469A-A542-AE5B4513E773}"/>
+              </a:ext>
+            </a:extLst>
+          </p:cNvPr>
           <p:cNvPicPr>
             <a:picLocks noChangeAspect="1" noChangeArrowheads="1"/>
           </p:cNvPicPr>
           <p:nvPr/>
         </p:nvPicPr>
         <p:blipFill>
-          <a:blip r:embed="rId2" cstate="hqprint"/>
+          <a:blip r:embed="rId4" cstate="hqprint"/>
           <a:srcRect/>
           <a:stretch>
             <a:fillRect/>
@@ -12555,62 +12682,10 @@
       </p:pic>
       <p:sp>
         <p:nvSpPr>
-          <p:cNvPr id="10" name="Content Placeholder 2">
+          <p:cNvPr id="3" name="Slide Number Placeholder 2">
             <a:extLst>
               <a:ext uri="{FF2B5EF4-FFF2-40B4-BE49-F238E27FC236}">
-                <a16:creationId xmlns:a16="http://schemas.microsoft.com/office/drawing/2014/main" id="{5ED2F716-FDFD-4110-A3F5-736217C04E74}"/>
-              </a:ext>
-            </a:extLst>
-          </p:cNvPr>
-          <p:cNvSpPr>
-            <a:spLocks noGrp="1"/>
-          </p:cNvSpPr>
-          <p:nvPr>
-            <p:ph idx="1"/>
-          </p:nvPr>
-        </p:nvSpPr>
-        <p:spPr>
-          <a:xfrm>
-            <a:off x="610225" y="1305007"/>
-            <a:ext cx="10949976" cy="5156349"/>
-          </a:xfrm>
-        </p:spPr>
-        <p:txBody>
-          <a:bodyPr>
-            <a:normAutofit/>
-          </a:bodyPr>
-          <a:lstStyle/>
-          <a:p>
-            <a:pPr algn="just">
-              <a:buClr>
-                <a:srgbClr val="FFC000"/>
-              </a:buClr>
-              <a:buFont typeface="Wingdings" panose="05000000000000000000" pitchFamily="2" charset="2"/>
-              <a:buChar char="§"/>
-            </a:pPr>
-            <a:r>
-              <a:rPr lang="en-GB" sz="2200"/>
-              <a:t>Stillstand reached with the Vertex Placement Alrogithm</a:t>
-            </a:r>
-          </a:p>
-          <a:p>
-            <a:pPr lvl="1" algn="just">
-              <a:buClr>
-                <a:srgbClr val="FFC000"/>
-              </a:buClr>
-              <a:buFont typeface="Wingdings" panose="05000000000000000000" pitchFamily="2" charset="2"/>
-              <a:buChar char="§"/>
-            </a:pPr>
-            <a:endParaRPr lang="en-GB" sz="1800"/>
-          </a:p>
-        </p:txBody>
-      </p:sp>
-      <p:sp>
-        <p:nvSpPr>
-          <p:cNvPr id="3" name="Slide Number Placeholder 2">
-            <a:extLst>
-              <a:ext uri="{FF2B5EF4-FFF2-40B4-BE49-F238E27FC236}">
-                <a16:creationId xmlns:a16="http://schemas.microsoft.com/office/drawing/2014/main" id="{862673D8-32B7-4425-88EA-E8D68219C457}"/>
+                <a16:creationId xmlns:a16="http://schemas.microsoft.com/office/drawing/2014/main" id="{BCAFB1F3-430E-4FEA-AAE2-35E48E79EECB}"/>
               </a:ext>
             </a:extLst>
           </p:cNvPr>
@@ -12638,10 +12713,185 @@
           </a:p>
         </p:txBody>
       </p:sp>
+      <p:pic>
+        <p:nvPicPr>
+          <p:cNvPr id="8" name="Picture 7">
+            <a:extLst>
+              <a:ext uri="{FF2B5EF4-FFF2-40B4-BE49-F238E27FC236}">
+                <a16:creationId xmlns:a16="http://schemas.microsoft.com/office/drawing/2014/main" id="{112AF475-7BC1-4EB0-BA76-2E85062A122D}"/>
+              </a:ext>
+            </a:extLst>
+          </p:cNvPr>
+          <p:cNvPicPr/>
+          <p:nvPr/>
+        </p:nvPicPr>
+        <p:blipFill>
+          <a:blip r:embed="rId5" cstate="print">
+            <a:extLst>
+              <a:ext uri="{28A0092B-C50C-407E-A947-70E740481C1C}">
+                <a14:useLocalDpi xmlns:a14="http://schemas.microsoft.com/office/drawing/2010/main" val="0"/>
+              </a:ext>
+            </a:extLst>
+          </a:blip>
+          <a:stretch>
+            <a:fillRect/>
+          </a:stretch>
+        </p:blipFill>
+        <p:spPr>
+          <a:xfrm>
+            <a:off x="8997561" y="2922382"/>
+            <a:ext cx="2626305" cy="1727224"/>
+          </a:xfrm>
+          <a:prstGeom prst="rect">
+            <a:avLst/>
+          </a:prstGeom>
+        </p:spPr>
+      </p:pic>
+      <p:cxnSp>
+        <p:nvCxnSpPr>
+          <p:cNvPr id="9" name="Straight Connector 8">
+            <a:extLst>
+              <a:ext uri="{FF2B5EF4-FFF2-40B4-BE49-F238E27FC236}">
+                <a16:creationId xmlns:a16="http://schemas.microsoft.com/office/drawing/2014/main" id="{0527ECD9-7779-4C3B-ACE1-37C78A2FFC33}"/>
+              </a:ext>
+            </a:extLst>
+          </p:cNvPr>
+          <p:cNvCxnSpPr>
+            <a:cxnSpLocks/>
+          </p:cNvCxnSpPr>
+          <p:nvPr/>
+        </p:nvCxnSpPr>
+        <p:spPr>
+          <a:xfrm>
+            <a:off x="6862354" y="1866900"/>
+            <a:ext cx="3257959" cy="1845502"/>
+          </a:xfrm>
+          <a:prstGeom prst="line">
+            <a:avLst/>
+          </a:prstGeom>
+          <a:ln w="3175">
+            <a:solidFill>
+              <a:srgbClr val="0000FF"/>
+            </a:solidFill>
+            <a:prstDash val="dash"/>
+          </a:ln>
+        </p:spPr>
+        <p:style>
+          <a:lnRef idx="1">
+            <a:schemeClr val="accent1"/>
+          </a:lnRef>
+          <a:fillRef idx="0">
+            <a:schemeClr val="accent1"/>
+          </a:fillRef>
+          <a:effectRef idx="0">
+            <a:schemeClr val="accent1"/>
+          </a:effectRef>
+          <a:fontRef idx="minor">
+            <a:schemeClr val="tx1"/>
+          </a:fontRef>
+        </p:style>
+      </p:cxnSp>
+      <p:cxnSp>
+        <p:nvCxnSpPr>
+          <p:cNvPr id="10" name="Straight Connector 9">
+            <a:extLst>
+              <a:ext uri="{FF2B5EF4-FFF2-40B4-BE49-F238E27FC236}">
+                <a16:creationId xmlns:a16="http://schemas.microsoft.com/office/drawing/2014/main" id="{74B43729-AF9D-43B0-8D54-0FF65BF3E389}"/>
+              </a:ext>
+            </a:extLst>
+          </p:cNvPr>
+          <p:cNvCxnSpPr>
+            <a:cxnSpLocks/>
+          </p:cNvCxnSpPr>
+          <p:nvPr/>
+        </p:nvCxnSpPr>
+        <p:spPr>
+          <a:xfrm flipV="1">
+            <a:off x="6862354" y="4414837"/>
+            <a:ext cx="3240881" cy="1747839"/>
+          </a:xfrm>
+          <a:prstGeom prst="line">
+            <a:avLst/>
+          </a:prstGeom>
+          <a:ln w="3175">
+            <a:solidFill>
+              <a:srgbClr val="0000FF"/>
+            </a:solidFill>
+            <a:prstDash val="dash"/>
+          </a:ln>
+        </p:spPr>
+        <p:style>
+          <a:lnRef idx="1">
+            <a:schemeClr val="accent1"/>
+          </a:lnRef>
+          <a:fillRef idx="0">
+            <a:schemeClr val="accent1"/>
+          </a:fillRef>
+          <a:effectRef idx="0">
+            <a:schemeClr val="accent1"/>
+          </a:effectRef>
+          <a:fontRef idx="minor">
+            <a:schemeClr val="tx1"/>
+          </a:fontRef>
+        </p:style>
+      </p:cxnSp>
+      <p:sp>
+        <p:nvSpPr>
+          <p:cNvPr id="14" name="Rectangle 13">
+            <a:extLst>
+              <a:ext uri="{FF2B5EF4-FFF2-40B4-BE49-F238E27FC236}">
+                <a16:creationId xmlns:a16="http://schemas.microsoft.com/office/drawing/2014/main" id="{A2C137CD-4B84-4EAC-B9A8-D644C050636B}"/>
+              </a:ext>
+            </a:extLst>
+          </p:cNvPr>
+          <p:cNvSpPr/>
+          <p:nvPr/>
+        </p:nvSpPr>
+        <p:spPr>
+          <a:xfrm>
+            <a:off x="9177338" y="3712403"/>
+            <a:ext cx="925897" cy="702435"/>
+          </a:xfrm>
+          <a:prstGeom prst="rect">
+            <a:avLst/>
+          </a:prstGeom>
+          <a:noFill/>
+          <a:ln w="19050">
+            <a:solidFill>
+              <a:srgbClr val="0000FF"/>
+            </a:solidFill>
+            <a:prstDash val="dash"/>
+          </a:ln>
+        </p:spPr>
+        <p:style>
+          <a:lnRef idx="2">
+            <a:schemeClr val="accent1">
+              <a:shade val="50000"/>
+            </a:schemeClr>
+          </a:lnRef>
+          <a:fillRef idx="1">
+            <a:schemeClr val="accent1"/>
+          </a:fillRef>
+          <a:effectRef idx="0">
+            <a:schemeClr val="accent1"/>
+          </a:effectRef>
+          <a:fontRef idx="minor">
+            <a:schemeClr val="lt1"/>
+          </a:fontRef>
+        </p:style>
+        <p:txBody>
+          <a:bodyPr rtlCol="0" anchor="ctr"/>
+          <a:lstStyle/>
+          <a:p>
+            <a:pPr algn="ctr"/>
+            <a:endParaRPr lang="en-US"/>
+          </a:p>
+        </p:txBody>
+      </p:sp>
     </p:spTree>
     <p:extLst>
       <p:ext uri="{BB962C8B-B14F-4D97-AF65-F5344CB8AC3E}">
-        <p14:creationId xmlns:p14="http://schemas.microsoft.com/office/powerpoint/2010/main" val="4078649375"/>
+        <p14:creationId xmlns:p14="http://schemas.microsoft.com/office/powerpoint/2010/main" val="545972004"/>
       </p:ext>
     </p:extLst>
   </p:cSld>
@@ -12697,7 +12947,26 @@
                 </a:solidFill>
                 <a:uFillTx/>
               </a:rPr>
-              <a:t>Corrections</a:t>
+              <a:t>Bachelor Thesis</a:t>
+            </a:r>
+            <a:br>
+              <a:rPr lang="en-US" sz="3200" b="1">
+                <a:solidFill>
+                  <a:srgbClr val="339966"/>
+                </a:solidFill>
+                <a:uFillTx/>
+              </a:rPr>
+            </a:br>
+            <a:r>
+              <a:rPr lang="en-US" sz="2200" b="1">
+                <a:solidFill>
+                  <a:schemeClr val="bg1">
+                    <a:lumMod val="50000"/>
+                  </a:schemeClr>
+                </a:solidFill>
+                <a:uFillTx/>
+              </a:rPr>
+              <a:t>Evaluation and Next Steps</a:t>
             </a:r>
             <a:endParaRPr lang="en-US" sz="2200" dirty="0">
               <a:solidFill>
@@ -12760,6 +13029,189 @@
         </p:spPr>
         <p:txBody>
           <a:bodyPr>
+            <a:normAutofit/>
+          </a:bodyPr>
+          <a:lstStyle/>
+          <a:p>
+            <a:pPr algn="just">
+              <a:buClr>
+                <a:srgbClr val="FFC000"/>
+              </a:buClr>
+              <a:buFont typeface="Wingdings" panose="05000000000000000000" pitchFamily="2" charset="2"/>
+              <a:buChar char="§"/>
+            </a:pPr>
+            <a:r>
+              <a:rPr lang="en-GB" sz="2200"/>
+              <a:t>Stillstand reached with the Vertex Placement Alrogithm</a:t>
+            </a:r>
+          </a:p>
+          <a:p>
+            <a:pPr lvl="1" algn="just">
+              <a:buClr>
+                <a:srgbClr val="FFC000"/>
+              </a:buClr>
+              <a:buFont typeface="Wingdings" panose="05000000000000000000" pitchFamily="2" charset="2"/>
+              <a:buChar char="§"/>
+            </a:pPr>
+            <a:endParaRPr lang="en-GB" sz="1800"/>
+          </a:p>
+        </p:txBody>
+      </p:sp>
+      <p:sp>
+        <p:nvSpPr>
+          <p:cNvPr id="3" name="Slide Number Placeholder 2">
+            <a:extLst>
+              <a:ext uri="{FF2B5EF4-FFF2-40B4-BE49-F238E27FC236}">
+                <a16:creationId xmlns:a16="http://schemas.microsoft.com/office/drawing/2014/main" id="{862673D8-32B7-4425-88EA-E8D68219C457}"/>
+              </a:ext>
+            </a:extLst>
+          </p:cNvPr>
+          <p:cNvSpPr>
+            <a:spLocks noGrp="1"/>
+          </p:cNvSpPr>
+          <p:nvPr>
+            <p:ph type="sldNum" sz="quarter" idx="12"/>
+          </p:nvPr>
+        </p:nvSpPr>
+        <p:spPr/>
+        <p:txBody>
+          <a:bodyPr/>
+          <a:lstStyle/>
+          <a:p>
+            <a:fld id="{99293C7F-59EB-4A3A-A30C-171723B2F31C}" type="slidenum">
+              <a:rPr lang="en-US" smtClean="0">
+                <a:uFillTx/>
+              </a:rPr>
+              <a:t>32</a:t>
+            </a:fld>
+            <a:endParaRPr lang="en-US">
+              <a:uFillTx/>
+            </a:endParaRPr>
+          </a:p>
+        </p:txBody>
+      </p:sp>
+    </p:spTree>
+    <p:extLst>
+      <p:ext uri="{BB962C8B-B14F-4D97-AF65-F5344CB8AC3E}">
+        <p14:creationId xmlns:p14="http://schemas.microsoft.com/office/powerpoint/2010/main" val="4078649375"/>
+      </p:ext>
+    </p:extLst>
+  </p:cSld>
+  <p:clrMapOvr>
+    <a:masterClrMapping/>
+  </p:clrMapOvr>
+</p:sld>
+</file>
+
+<file path=ppt/slides/slide33.xml><?xml version="1.0" encoding="utf-8"?>
+<p:sld xmlns:a="http://schemas.openxmlformats.org/drawingml/2006/main" xmlns:r="http://schemas.openxmlformats.org/officeDocument/2006/relationships" xmlns:p="http://schemas.openxmlformats.org/presentationml/2006/main">
+  <p:cSld>
+    <p:spTree>
+      <p:nvGrpSpPr>
+        <p:cNvPr id="1" name=""/>
+        <p:cNvGrpSpPr/>
+        <p:nvPr/>
+      </p:nvGrpSpPr>
+      <p:grpSpPr>
+        <a:xfrm>
+          <a:off x="0" y="0"/>
+          <a:ext cx="0" cy="0"/>
+          <a:chOff x="0" y="0"/>
+          <a:chExt cx="0" cy="0"/>
+        </a:xfrm>
+      </p:grpSpPr>
+      <p:sp>
+        <p:nvSpPr>
+          <p:cNvPr id="2" name="Title 1"/>
+          <p:cNvSpPr>
+            <a:spLocks noGrp="1"/>
+          </p:cNvSpPr>
+          <p:nvPr>
+            <p:ph type="title"/>
+          </p:nvPr>
+        </p:nvSpPr>
+        <p:spPr>
+          <a:xfrm>
+            <a:off x="137012" y="18256"/>
+            <a:ext cx="11917976" cy="1004729"/>
+          </a:xfrm>
+        </p:spPr>
+        <p:txBody>
+          <a:bodyPr>
+            <a:normAutofit/>
+          </a:bodyPr>
+          <a:lstStyle/>
+          <a:p>
+            <a:r>
+              <a:rPr lang="en-US" sz="4000" b="1">
+                <a:solidFill>
+                  <a:srgbClr val="339966"/>
+                </a:solidFill>
+                <a:uFillTx/>
+              </a:rPr>
+              <a:t>Corrections</a:t>
+            </a:r>
+            <a:endParaRPr lang="en-US" sz="2200" dirty="0">
+              <a:solidFill>
+                <a:schemeClr val="bg1">
+                  <a:lumMod val="50000"/>
+                </a:schemeClr>
+              </a:solidFill>
+              <a:uFillTx/>
+            </a:endParaRPr>
+          </a:p>
+        </p:txBody>
+      </p:sp>
+      <p:pic>
+        <p:nvPicPr>
+          <p:cNvPr id="9" name="Picture 2" descr="Image result for gefasoft logo svg"/>
+          <p:cNvPicPr>
+            <a:picLocks noChangeAspect="1" noChangeArrowheads="1"/>
+          </p:cNvPicPr>
+          <p:nvPr/>
+        </p:nvPicPr>
+        <p:blipFill>
+          <a:blip r:embed="rId2" cstate="hqprint"/>
+          <a:srcRect/>
+          <a:stretch>
+            <a:fillRect/>
+          </a:stretch>
+        </p:blipFill>
+        <p:spPr bwMode="auto">
+          <a:xfrm>
+            <a:off x="10287816" y="341301"/>
+            <a:ext cx="1641442" cy="358638"/>
+          </a:xfrm>
+          <a:prstGeom prst="rect">
+            <a:avLst/>
+          </a:prstGeom>
+          <a:noFill/>
+        </p:spPr>
+      </p:pic>
+      <p:sp>
+        <p:nvSpPr>
+          <p:cNvPr id="10" name="Content Placeholder 2">
+            <a:extLst>
+              <a:ext uri="{FF2B5EF4-FFF2-40B4-BE49-F238E27FC236}">
+                <a16:creationId xmlns:a16="http://schemas.microsoft.com/office/drawing/2014/main" id="{5ED2F716-FDFD-4110-A3F5-736217C04E74}"/>
+              </a:ext>
+            </a:extLst>
+          </p:cNvPr>
+          <p:cNvSpPr>
+            <a:spLocks noGrp="1"/>
+          </p:cNvSpPr>
+          <p:nvPr>
+            <p:ph idx="1"/>
+          </p:nvPr>
+        </p:nvSpPr>
+        <p:spPr>
+          <a:xfrm>
+            <a:off x="610225" y="1305007"/>
+            <a:ext cx="10949976" cy="5156349"/>
+          </a:xfrm>
+        </p:spPr>
+        <p:txBody>
+          <a:bodyPr>
             <a:normAutofit lnSpcReduction="10000"/>
           </a:bodyPr>
           <a:lstStyle/>
@@ -13006,7 +13458,7 @@
               <a:rPr lang="en-US" smtClean="0">
                 <a:uFillTx/>
               </a:rPr>
-              <a:t>32</a:t>
+              <a:t>33</a:t>
             </a:fld>
             <a:endParaRPr lang="en-US">
               <a:uFillTx/>

</xml_diff>